<commit_message>
2022-05-06 Update01 1. CategoryItem Field 명칭 수정 Cate -> Item 2. CateGroup, Item 프로시저 생성 및 모델 작성 3. Frm_Info_CategoryItem CRUD 개발
</commit_message>
<xml_diff>
--- a/00. 설계/UI 설계.pptx
+++ b/00. 설계/UI 설계.pptx
@@ -276,7 +276,7 @@
           <a:p>
             <a:fld id="{D10E3CB5-134D-4A29-A05D-5C87D28C10D2}" type="datetimeFigureOut">
               <a:rPr lang="ko-KR" altLang="en-US" smtClean="0"/>
-              <a:t>2022-05-05</a:t>
+              <a:t>2022-05-06</a:t>
             </a:fld>
             <a:endParaRPr lang="ko-KR" altLang="en-US"/>
           </a:p>
@@ -474,7 +474,7 @@
           <a:p>
             <a:fld id="{D10E3CB5-134D-4A29-A05D-5C87D28C10D2}" type="datetimeFigureOut">
               <a:rPr lang="ko-KR" altLang="en-US" smtClean="0"/>
-              <a:t>2022-05-05</a:t>
+              <a:t>2022-05-06</a:t>
             </a:fld>
             <a:endParaRPr lang="ko-KR" altLang="en-US"/>
           </a:p>
@@ -682,7 +682,7 @@
           <a:p>
             <a:fld id="{D10E3CB5-134D-4A29-A05D-5C87D28C10D2}" type="datetimeFigureOut">
               <a:rPr lang="ko-KR" altLang="en-US" smtClean="0"/>
-              <a:t>2022-05-05</a:t>
+              <a:t>2022-05-06</a:t>
             </a:fld>
             <a:endParaRPr lang="ko-KR" altLang="en-US"/>
           </a:p>
@@ -880,7 +880,7 @@
           <a:p>
             <a:fld id="{D10E3CB5-134D-4A29-A05D-5C87D28C10D2}" type="datetimeFigureOut">
               <a:rPr lang="ko-KR" altLang="en-US" smtClean="0"/>
-              <a:t>2022-05-05</a:t>
+              <a:t>2022-05-06</a:t>
             </a:fld>
             <a:endParaRPr lang="ko-KR" altLang="en-US"/>
           </a:p>
@@ -1155,7 +1155,7 @@
           <a:p>
             <a:fld id="{D10E3CB5-134D-4A29-A05D-5C87D28C10D2}" type="datetimeFigureOut">
               <a:rPr lang="ko-KR" altLang="en-US" smtClean="0"/>
-              <a:t>2022-05-05</a:t>
+              <a:t>2022-05-06</a:t>
             </a:fld>
             <a:endParaRPr lang="ko-KR" altLang="en-US"/>
           </a:p>
@@ -1420,7 +1420,7 @@
           <a:p>
             <a:fld id="{D10E3CB5-134D-4A29-A05D-5C87D28C10D2}" type="datetimeFigureOut">
               <a:rPr lang="ko-KR" altLang="en-US" smtClean="0"/>
-              <a:t>2022-05-05</a:t>
+              <a:t>2022-05-06</a:t>
             </a:fld>
             <a:endParaRPr lang="ko-KR" altLang="en-US"/>
           </a:p>
@@ -1832,7 +1832,7 @@
           <a:p>
             <a:fld id="{D10E3CB5-134D-4A29-A05D-5C87D28C10D2}" type="datetimeFigureOut">
               <a:rPr lang="ko-KR" altLang="en-US" smtClean="0"/>
-              <a:t>2022-05-05</a:t>
+              <a:t>2022-05-06</a:t>
             </a:fld>
             <a:endParaRPr lang="ko-KR" altLang="en-US"/>
           </a:p>
@@ -1973,7 +1973,7 @@
           <a:p>
             <a:fld id="{D10E3CB5-134D-4A29-A05D-5C87D28C10D2}" type="datetimeFigureOut">
               <a:rPr lang="ko-KR" altLang="en-US" smtClean="0"/>
-              <a:t>2022-05-05</a:t>
+              <a:t>2022-05-06</a:t>
             </a:fld>
             <a:endParaRPr lang="ko-KR" altLang="en-US"/>
           </a:p>
@@ -2086,7 +2086,7 @@
           <a:p>
             <a:fld id="{D10E3CB5-134D-4A29-A05D-5C87D28C10D2}" type="datetimeFigureOut">
               <a:rPr lang="ko-KR" altLang="en-US" smtClean="0"/>
-              <a:t>2022-05-05</a:t>
+              <a:t>2022-05-06</a:t>
             </a:fld>
             <a:endParaRPr lang="ko-KR" altLang="en-US"/>
           </a:p>
@@ -2397,7 +2397,7 @@
           <a:p>
             <a:fld id="{D10E3CB5-134D-4A29-A05D-5C87D28C10D2}" type="datetimeFigureOut">
               <a:rPr lang="ko-KR" altLang="en-US" smtClean="0"/>
-              <a:t>2022-05-05</a:t>
+              <a:t>2022-05-06</a:t>
             </a:fld>
             <a:endParaRPr lang="ko-KR" altLang="en-US"/>
           </a:p>
@@ -2685,7 +2685,7 @@
           <a:p>
             <a:fld id="{D10E3CB5-134D-4A29-A05D-5C87D28C10D2}" type="datetimeFigureOut">
               <a:rPr lang="ko-KR" altLang="en-US" smtClean="0"/>
-              <a:t>2022-05-05</a:t>
+              <a:t>2022-05-06</a:t>
             </a:fld>
             <a:endParaRPr lang="ko-KR" altLang="en-US"/>
           </a:p>
@@ -2926,7 +2926,7 @@
           <a:p>
             <a:fld id="{D10E3CB5-134D-4A29-A05D-5C87D28C10D2}" type="datetimeFigureOut">
               <a:rPr lang="ko-KR" altLang="en-US" smtClean="0"/>
-              <a:t>2022-05-05</a:t>
+              <a:t>2022-05-06</a:t>
             </a:fld>
             <a:endParaRPr lang="ko-KR" altLang="en-US"/>
           </a:p>
@@ -21193,7 +21193,7 @@
                   <a:schemeClr val="tx1"/>
                 </a:solidFill>
               </a:rPr>
-              <a:t>저장</a:t>
+              <a:t>삭제</a:t>
             </a:r>
           </a:p>
         </p:txBody>
@@ -21604,29 +21604,8 @@
                   <a:schemeClr val="tx1"/>
                 </a:solidFill>
               </a:rPr>
-              <a:t>선택한</a:t>
-            </a:r>
-            <a:endParaRPr lang="en-US" altLang="ko-KR" dirty="0">
-              <a:solidFill>
-                <a:schemeClr val="tx1"/>
-              </a:solidFill>
-            </a:endParaRPr>
-          </a:p>
-          <a:p>
-            <a:pPr algn="ctr"/>
-            <a:r>
-              <a:rPr lang="ko-KR" altLang="en-US" dirty="0" err="1">
-                <a:solidFill>
-                  <a:schemeClr val="tx1"/>
-                </a:solidFill>
-              </a:rPr>
-              <a:t>공정명</a:t>
-            </a:r>
-            <a:endParaRPr lang="ko-KR" altLang="en-US" dirty="0">
-              <a:solidFill>
-                <a:schemeClr val="tx1"/>
-              </a:solidFill>
-            </a:endParaRPr>
+              <a:t>저장</a:t>
+            </a:r>
           </a:p>
         </p:txBody>
       </p:sp>

</xml_diff>